<commit_message>
2024_0515 22:21 LAB4 complete
</commit_message>
<xml_diff>
--- a/LAB/AOC_2024_Lab4/FSM.pptx
+++ b/LAB/AOC_2024_Lab4/FSM.pptx
@@ -104,6 +104,11 @@
       </a:defRPr>
     </a:lvl9pPr>
   </p:defaultTextStyle>
+  <p:extLst>
+    <p:ext uri="{EFAFB233-063F-42B5-8137-9DF3F51BA10A}">
+      <p15:sldGuideLst xmlns:p15="http://schemas.microsoft.com/office/powerpoint/2012/main"/>
+    </p:ext>
+  </p:extLst>
 </p:presentation>
 </file>
 
@@ -254,7 +259,7 @@
           <a:p>
             <a:fld id="{50897248-8239-4D3B-BC7B-13852FDD490A}" type="datetimeFigureOut">
               <a:rPr lang="zh-TW" altLang="en-US" smtClean="0"/>
-              <a:t>2024/5/14</a:t>
+              <a:t>2024/5/15</a:t>
             </a:fld>
             <a:endParaRPr lang="zh-TW" altLang="en-US"/>
           </a:p>
@@ -452,7 +457,7 @@
           <a:p>
             <a:fld id="{50897248-8239-4D3B-BC7B-13852FDD490A}" type="datetimeFigureOut">
               <a:rPr lang="zh-TW" altLang="en-US" smtClean="0"/>
-              <a:t>2024/5/14</a:t>
+              <a:t>2024/5/15</a:t>
             </a:fld>
             <a:endParaRPr lang="zh-TW" altLang="en-US"/>
           </a:p>
@@ -660,7 +665,7 @@
           <a:p>
             <a:fld id="{50897248-8239-4D3B-BC7B-13852FDD490A}" type="datetimeFigureOut">
               <a:rPr lang="zh-TW" altLang="en-US" smtClean="0"/>
-              <a:t>2024/5/14</a:t>
+              <a:t>2024/5/15</a:t>
             </a:fld>
             <a:endParaRPr lang="zh-TW" altLang="en-US"/>
           </a:p>
@@ -858,7 +863,7 @@
           <a:p>
             <a:fld id="{50897248-8239-4D3B-BC7B-13852FDD490A}" type="datetimeFigureOut">
               <a:rPr lang="zh-TW" altLang="en-US" smtClean="0"/>
-              <a:t>2024/5/14</a:t>
+              <a:t>2024/5/15</a:t>
             </a:fld>
             <a:endParaRPr lang="zh-TW" altLang="en-US"/>
           </a:p>
@@ -1133,7 +1138,7 @@
           <a:p>
             <a:fld id="{50897248-8239-4D3B-BC7B-13852FDD490A}" type="datetimeFigureOut">
               <a:rPr lang="zh-TW" altLang="en-US" smtClean="0"/>
-              <a:t>2024/5/14</a:t>
+              <a:t>2024/5/15</a:t>
             </a:fld>
             <a:endParaRPr lang="zh-TW" altLang="en-US"/>
           </a:p>
@@ -1398,7 +1403,7 @@
           <a:p>
             <a:fld id="{50897248-8239-4D3B-BC7B-13852FDD490A}" type="datetimeFigureOut">
               <a:rPr lang="zh-TW" altLang="en-US" smtClean="0"/>
-              <a:t>2024/5/14</a:t>
+              <a:t>2024/5/15</a:t>
             </a:fld>
             <a:endParaRPr lang="zh-TW" altLang="en-US"/>
           </a:p>
@@ -1810,7 +1815,7 @@
           <a:p>
             <a:fld id="{50897248-8239-4D3B-BC7B-13852FDD490A}" type="datetimeFigureOut">
               <a:rPr lang="zh-TW" altLang="en-US" smtClean="0"/>
-              <a:t>2024/5/14</a:t>
+              <a:t>2024/5/15</a:t>
             </a:fld>
             <a:endParaRPr lang="zh-TW" altLang="en-US"/>
           </a:p>
@@ -1951,7 +1956,7 @@
           <a:p>
             <a:fld id="{50897248-8239-4D3B-BC7B-13852FDD490A}" type="datetimeFigureOut">
               <a:rPr lang="zh-TW" altLang="en-US" smtClean="0"/>
-              <a:t>2024/5/14</a:t>
+              <a:t>2024/5/15</a:t>
             </a:fld>
             <a:endParaRPr lang="zh-TW" altLang="en-US"/>
           </a:p>
@@ -2064,7 +2069,7 @@
           <a:p>
             <a:fld id="{50897248-8239-4D3B-BC7B-13852FDD490A}" type="datetimeFigureOut">
               <a:rPr lang="zh-TW" altLang="en-US" smtClean="0"/>
-              <a:t>2024/5/14</a:t>
+              <a:t>2024/5/15</a:t>
             </a:fld>
             <a:endParaRPr lang="zh-TW" altLang="en-US"/>
           </a:p>
@@ -2375,7 +2380,7 @@
           <a:p>
             <a:fld id="{50897248-8239-4D3B-BC7B-13852FDD490A}" type="datetimeFigureOut">
               <a:rPr lang="zh-TW" altLang="en-US" smtClean="0"/>
-              <a:t>2024/5/14</a:t>
+              <a:t>2024/5/15</a:t>
             </a:fld>
             <a:endParaRPr lang="zh-TW" altLang="en-US"/>
           </a:p>
@@ -2663,7 +2668,7 @@
           <a:p>
             <a:fld id="{50897248-8239-4D3B-BC7B-13852FDD490A}" type="datetimeFigureOut">
               <a:rPr lang="zh-TW" altLang="en-US" smtClean="0"/>
-              <a:t>2024/5/14</a:t>
+              <a:t>2024/5/15</a:t>
             </a:fld>
             <a:endParaRPr lang="zh-TW" altLang="en-US"/>
           </a:p>
@@ -2904,7 +2909,7 @@
           <a:p>
             <a:fld id="{50897248-8239-4D3B-BC7B-13852FDD490A}" type="datetimeFigureOut">
               <a:rPr lang="zh-TW" altLang="en-US" smtClean="0"/>
-              <a:t>2024/5/14</a:t>
+              <a:t>2024/5/15</a:t>
             </a:fld>
             <a:endParaRPr lang="zh-TW" altLang="en-US"/>
           </a:p>
@@ -4065,50 +4070,6 @@
       </p:sp>
       <p:cxnSp>
         <p:nvCxnSpPr>
-          <p:cNvPr id="28" name="接點: 弧形 27">
-            <a:extLst>
-              <a:ext uri="{FF2B5EF4-FFF2-40B4-BE49-F238E27FC236}">
-                <a16:creationId xmlns:a16="http://schemas.microsoft.com/office/drawing/2014/main" id="{2E764CD4-EBC4-0923-9561-5682552F7E76}"/>
-              </a:ext>
-            </a:extLst>
-          </p:cNvPr>
-          <p:cNvCxnSpPr>
-            <a:stCxn id="4" idx="0"/>
-            <a:endCxn id="4" idx="1"/>
-          </p:cNvCxnSpPr>
-          <p:nvPr/>
-        </p:nvCxnSpPr>
-        <p:spPr>
-          <a:xfrm rot="16200000" flipH="1" flipV="1">
-            <a:off x="892315" y="4158694"/>
-            <a:ext cx="149711" cy="395651"/>
-          </a:xfrm>
-          <a:prstGeom prst="curvedConnector3">
-            <a:avLst>
-              <a:gd name="adj1" fmla="val -152694"/>
-            </a:avLst>
-          </a:prstGeom>
-          <a:ln>
-            <a:tailEnd type="triangle"/>
-          </a:ln>
-        </p:spPr>
-        <p:style>
-          <a:lnRef idx="2">
-            <a:schemeClr val="dk1"/>
-          </a:lnRef>
-          <a:fillRef idx="0">
-            <a:schemeClr val="dk1"/>
-          </a:fillRef>
-          <a:effectRef idx="1">
-            <a:schemeClr val="dk1"/>
-          </a:effectRef>
-          <a:fontRef idx="minor">
-            <a:schemeClr val="tx1"/>
-          </a:fontRef>
-        </p:style>
-      </p:cxnSp>
-      <p:cxnSp>
-        <p:nvCxnSpPr>
           <p:cNvPr id="35" name="接點: 弧形 34">
             <a:extLst>
               <a:ext uri="{FF2B5EF4-FFF2-40B4-BE49-F238E27FC236}">
@@ -4251,7 +4212,7 @@
         </p:nvSpPr>
         <p:spPr>
           <a:xfrm>
-            <a:off x="1724531" y="2612875"/>
+            <a:off x="2560108" y="2718274"/>
             <a:ext cx="3186193" cy="923330"/>
           </a:xfrm>
           <a:prstGeom prst="rect">
@@ -4558,6 +4519,136 @@
             <a:r>
               <a:rPr lang="en-US" altLang="zh-TW" dirty="0"/>
               <a:t>ipsum_handshake</a:t>
+            </a:r>
+            <a:endParaRPr lang="zh-TW" altLang="en-US" dirty="0"/>
+          </a:p>
+        </p:txBody>
+      </p:sp>
+      <p:cxnSp>
+        <p:nvCxnSpPr>
+          <p:cNvPr id="3" name="接點: 弧形 2">
+            <a:extLst>
+              <a:ext uri="{FF2B5EF4-FFF2-40B4-BE49-F238E27FC236}">
+                <a16:creationId xmlns:a16="http://schemas.microsoft.com/office/drawing/2014/main" id="{44373F62-877D-520A-5E34-6C2061A59934}"/>
+              </a:ext>
+            </a:extLst>
+          </p:cNvPr>
+          <p:cNvCxnSpPr>
+            <a:stCxn id="11" idx="2"/>
+            <a:endCxn id="4" idx="0"/>
+          </p:cNvCxnSpPr>
+          <p:nvPr/>
+        </p:nvCxnSpPr>
+        <p:spPr>
+          <a:xfrm rot="10800000" flipV="1">
+            <a:off x="1164996" y="2017951"/>
+            <a:ext cx="3453598" cy="2263714"/>
+          </a:xfrm>
+          <a:prstGeom prst="curvedConnector2">
+            <a:avLst/>
+          </a:prstGeom>
+          <a:ln>
+            <a:solidFill>
+              <a:schemeClr val="tx1"/>
+            </a:solidFill>
+            <a:tailEnd type="triangle"/>
+          </a:ln>
+        </p:spPr>
+        <p:style>
+          <a:lnRef idx="2">
+            <a:schemeClr val="accent1"/>
+          </a:lnRef>
+          <a:fillRef idx="0">
+            <a:schemeClr val="accent1"/>
+          </a:fillRef>
+          <a:effectRef idx="1">
+            <a:schemeClr val="accent1"/>
+          </a:effectRef>
+          <a:fontRef idx="minor">
+            <a:schemeClr val="tx1"/>
+          </a:fontRef>
+        </p:style>
+      </p:cxnSp>
+      <p:cxnSp>
+        <p:nvCxnSpPr>
+          <p:cNvPr id="6" name="接點: 弧形 5">
+            <a:extLst>
+              <a:ext uri="{FF2B5EF4-FFF2-40B4-BE49-F238E27FC236}">
+                <a16:creationId xmlns:a16="http://schemas.microsoft.com/office/drawing/2014/main" id="{6E272FA2-9474-9BDF-4625-976F90596AD7}"/>
+              </a:ext>
+            </a:extLst>
+          </p:cNvPr>
+          <p:cNvCxnSpPr>
+            <a:stCxn id="4" idx="3"/>
+            <a:endCxn id="4" idx="2"/>
+          </p:cNvCxnSpPr>
+          <p:nvPr/>
+        </p:nvCxnSpPr>
+        <p:spPr>
+          <a:xfrm rot="5400000" flipH="1">
+            <a:off x="506686" y="4891585"/>
+            <a:ext cx="361434" cy="163884"/>
+          </a:xfrm>
+          <a:prstGeom prst="curvedConnector4">
+            <a:avLst>
+              <a:gd name="adj1" fmla="val -104669"/>
+              <a:gd name="adj2" fmla="val 239489"/>
+            </a:avLst>
+          </a:prstGeom>
+          <a:ln>
+            <a:tailEnd type="triangle"/>
+          </a:ln>
+        </p:spPr>
+        <p:style>
+          <a:lnRef idx="2">
+            <a:schemeClr val="dk1"/>
+          </a:lnRef>
+          <a:fillRef idx="0">
+            <a:schemeClr val="dk1"/>
+          </a:fillRef>
+          <a:effectRef idx="1">
+            <a:schemeClr val="dk1"/>
+          </a:effectRef>
+          <a:fontRef idx="minor">
+            <a:schemeClr val="tx1"/>
+          </a:fontRef>
+        </p:style>
+      </p:cxnSp>
+      <p:sp>
+        <p:nvSpPr>
+          <p:cNvPr id="13" name="文字方塊 12">
+            <a:extLst>
+              <a:ext uri="{FF2B5EF4-FFF2-40B4-BE49-F238E27FC236}">
+                <a16:creationId xmlns:a16="http://schemas.microsoft.com/office/drawing/2014/main" id="{06575452-73B1-7627-1ADB-1BBCF67EDFFD}"/>
+              </a:ext>
+            </a:extLst>
+          </p:cNvPr>
+          <p:cNvSpPr txBox="1"/>
+          <p:nvPr/>
+        </p:nvSpPr>
+        <p:spPr>
+          <a:xfrm>
+            <a:off x="838689" y="1800290"/>
+            <a:ext cx="3186193" cy="646331"/>
+          </a:xfrm>
+          <a:prstGeom prst="rect">
+            <a:avLst/>
+          </a:prstGeom>
+          <a:noFill/>
+        </p:spPr>
+        <p:txBody>
+          <a:bodyPr wrap="square" rtlCol="0">
+            <a:spAutoFit/>
+          </a:bodyPr>
+          <a:lstStyle/>
+          <a:p>
+            <a:r>
+              <a:rPr lang="en-US" altLang="zh-TW" dirty="0" err="1"/>
+              <a:t>All_done</a:t>
+            </a:r>
+            <a:r>
+              <a:rPr lang="en-US" altLang="zh-TW" dirty="0"/>
+              <a:t> &amp;&amp; ipsum_handshake</a:t>
             </a:r>
             <a:endParaRPr lang="zh-TW" altLang="en-US" dirty="0"/>
           </a:p>

</xml_diff>